<commit_message>
update keyword process map
</commit_message>
<xml_diff>
--- a/關鍵字推薦系統流程.pptx
+++ b/關鍵字推薦系統流程.pptx
@@ -104,6 +104,11 @@
       </a:defRPr>
     </a:lvl9pPr>
   </p:defaultTextStyle>
+  <p:extLst>
+    <p:ext uri="{EFAFB233-063F-42B5-8137-9DF3F51BA10A}">
+      <p15:sldGuideLst xmlns:p15="http://schemas.microsoft.com/office/powerpoint/2012/main"/>
+    </p:ext>
+  </p:extLst>
 </p:presentation>
 </file>
 
@@ -1298,7 +1303,20 @@
               <a:latin typeface="Microsoft JhengHei" panose="020B0604030504040204" pitchFamily="34" charset="-120"/>
               <a:ea typeface="Microsoft JhengHei" panose="020B0604030504040204" pitchFamily="34" charset="-120"/>
             </a:rPr>
-            <a:t>輸入結巴工具演算</a:t>
+            <a:t>原始資料輸入</a:t>
+          </a:r>
+          <a:br>
+            <a:rPr lang="en-US" altLang="zh-TW" dirty="0">
+              <a:latin typeface="Microsoft JhengHei" panose="020B0604030504040204" pitchFamily="34" charset="-120"/>
+              <a:ea typeface="Microsoft JhengHei" panose="020B0604030504040204" pitchFamily="34" charset="-120"/>
+            </a:rPr>
+          </a:br>
+          <a:r>
+            <a:rPr lang="zh-TW" altLang="en-US" dirty="0">
+              <a:latin typeface="Microsoft JhengHei" panose="020B0604030504040204" pitchFamily="34" charset="-120"/>
+              <a:ea typeface="Microsoft JhengHei" panose="020B0604030504040204" pitchFamily="34" charset="-120"/>
+            </a:rPr>
+            <a:t>斷詞工具演算</a:t>
           </a:r>
         </a:p>
       </dgm:t>
@@ -1363,7 +1381,7 @@
               <a:latin typeface="Microsoft JhengHei" panose="020B0604030504040204" pitchFamily="34" charset="-120"/>
               <a:ea typeface="Microsoft JhengHei" panose="020B0604030504040204" pitchFamily="34" charset="-120"/>
             </a:rPr>
-            <a:t>篩選出多餘贅詞</a:t>
+            <a:t>剔除多餘贅詞</a:t>
           </a:r>
         </a:p>
       </dgm:t>
@@ -1466,7 +1484,27 @@
               <a:latin typeface="Microsoft JhengHei" panose="020B0604030504040204" pitchFamily="34" charset="-120"/>
               <a:ea typeface="Microsoft JhengHei" panose="020B0604030504040204" pitchFamily="34" charset="-120"/>
             </a:rPr>
-            <a:t>輸入甲方文案做相似度比對</a:t>
+            <a:t>利用</a:t>
+          </a:r>
+          <a:r>
+            <a:rPr lang="en-US" altLang="zh-TW" dirty="0" err="1">
+              <a:latin typeface="Microsoft JhengHei" panose="020B0604030504040204" pitchFamily="34" charset="-120"/>
+              <a:ea typeface="Microsoft JhengHei" panose="020B0604030504040204" pitchFamily="34" charset="-120"/>
+            </a:rPr>
+            <a:t>XGBoost</a:t>
+          </a:r>
+          <a:br>
+            <a:rPr lang="en-US" altLang="zh-TW" dirty="0">
+              <a:latin typeface="Microsoft JhengHei" panose="020B0604030504040204" pitchFamily="34" charset="-120"/>
+              <a:ea typeface="Microsoft JhengHei" panose="020B0604030504040204" pitchFamily="34" charset="-120"/>
+            </a:rPr>
+          </a:br>
+          <a:r>
+            <a:rPr lang="zh-TW" altLang="en-US" dirty="0">
+              <a:latin typeface="Microsoft JhengHei" panose="020B0604030504040204" pitchFamily="34" charset="-120"/>
+              <a:ea typeface="Microsoft JhengHei" panose="020B0604030504040204" pitchFamily="34" charset="-120"/>
+            </a:rPr>
+            <a:t>產出相似度報告與關鍵字建議</a:t>
           </a:r>
         </a:p>
       </dgm:t>
@@ -1511,7 +1549,40 @@
               <a:latin typeface="Microsoft JhengHei" panose="020B0604030504040204" pitchFamily="34" charset="-120"/>
               <a:ea typeface="Microsoft JhengHei" panose="020B0604030504040204" pitchFamily="34" charset="-120"/>
             </a:rPr>
-            <a:t>產出相似度報告與關鍵字建議</a:t>
+            <a:t>結合</a:t>
+          </a:r>
+          <a:r>
+            <a:rPr lang="en-US" altLang="zh-TW" dirty="0">
+              <a:latin typeface="Microsoft JhengHei" panose="020B0604030504040204" pitchFamily="34" charset="-120"/>
+              <a:ea typeface="Microsoft JhengHei" panose="020B0604030504040204" pitchFamily="34" charset="-120"/>
+            </a:rPr>
+            <a:t>Open AI API</a:t>
+          </a:r>
+          <a:br>
+            <a:rPr lang="en-US" altLang="zh-TW" dirty="0">
+              <a:latin typeface="Microsoft JhengHei" panose="020B0604030504040204" pitchFamily="34" charset="-120"/>
+              <a:ea typeface="Microsoft JhengHei" panose="020B0604030504040204" pitchFamily="34" charset="-120"/>
+            </a:rPr>
+          </a:br>
+          <a:r>
+            <a:rPr lang="zh-TW" altLang="en-US" dirty="0">
+              <a:latin typeface="Microsoft JhengHei" panose="020B0604030504040204" pitchFamily="34" charset="-120"/>
+              <a:ea typeface="Microsoft JhengHei" panose="020B0604030504040204" pitchFamily="34" charset="-120"/>
+            </a:rPr>
+            <a:t>自動生成</a:t>
+          </a:r>
+          <a:br>
+            <a:rPr lang="en-US" altLang="zh-TW" dirty="0">
+              <a:latin typeface="Microsoft JhengHei" panose="020B0604030504040204" pitchFamily="34" charset="-120"/>
+              <a:ea typeface="Microsoft JhengHei" panose="020B0604030504040204" pitchFamily="34" charset="-120"/>
+            </a:rPr>
+          </a:br>
+          <a:r>
+            <a:rPr lang="zh-TW" altLang="en-US" dirty="0">
+              <a:latin typeface="Microsoft JhengHei" panose="020B0604030504040204" pitchFamily="34" charset="-120"/>
+              <a:ea typeface="Microsoft JhengHei" panose="020B0604030504040204" pitchFamily="34" charset="-120"/>
+            </a:rPr>
+            <a:t>客製化優質文稿</a:t>
           </a:r>
         </a:p>
       </dgm:t>
@@ -2530,7 +2601,20 @@
               <a:latin typeface="Microsoft JhengHei" panose="020B0604030504040204" pitchFamily="34" charset="-120"/>
               <a:ea typeface="Microsoft JhengHei" panose="020B0604030504040204" pitchFamily="34" charset="-120"/>
             </a:rPr>
-            <a:t>輸入結巴工具演算</a:t>
+            <a:t>原始資料輸入</a:t>
+          </a:r>
+          <a:br>
+            <a:rPr lang="en-US" altLang="zh-TW" sz="1400" kern="1200" dirty="0">
+              <a:latin typeface="Microsoft JhengHei" panose="020B0604030504040204" pitchFamily="34" charset="-120"/>
+              <a:ea typeface="Microsoft JhengHei" panose="020B0604030504040204" pitchFamily="34" charset="-120"/>
+            </a:rPr>
+          </a:br>
+          <a:r>
+            <a:rPr lang="zh-TW" altLang="en-US" sz="1400" kern="1200" dirty="0">
+              <a:latin typeface="Microsoft JhengHei" panose="020B0604030504040204" pitchFamily="34" charset="-120"/>
+              <a:ea typeface="Microsoft JhengHei" panose="020B0604030504040204" pitchFamily="34" charset="-120"/>
+            </a:rPr>
+            <a:t>斷詞工具演算</a:t>
           </a:r>
         </a:p>
       </dsp:txBody>
@@ -2705,7 +2789,7 @@
               <a:latin typeface="Microsoft JhengHei" panose="020B0604030504040204" pitchFamily="34" charset="-120"/>
               <a:ea typeface="Microsoft JhengHei" panose="020B0604030504040204" pitchFamily="34" charset="-120"/>
             </a:rPr>
-            <a:t>篩選出多餘贅詞</a:t>
+            <a:t>剔除多餘贅詞</a:t>
           </a:r>
         </a:p>
       </dsp:txBody>
@@ -3028,7 +3112,27 @@
               <a:latin typeface="Microsoft JhengHei" panose="020B0604030504040204" pitchFamily="34" charset="-120"/>
               <a:ea typeface="Microsoft JhengHei" panose="020B0604030504040204" pitchFamily="34" charset="-120"/>
             </a:rPr>
-            <a:t>輸入甲方文案做相似度比對</a:t>
+            <a:t>利用</a:t>
+          </a:r>
+          <a:r>
+            <a:rPr lang="en-US" altLang="zh-TW" sz="1400" kern="1200" dirty="0" err="1">
+              <a:latin typeface="Microsoft JhengHei" panose="020B0604030504040204" pitchFamily="34" charset="-120"/>
+              <a:ea typeface="Microsoft JhengHei" panose="020B0604030504040204" pitchFamily="34" charset="-120"/>
+            </a:rPr>
+            <a:t>XGBoost</a:t>
+          </a:r>
+          <a:br>
+            <a:rPr lang="en-US" altLang="zh-TW" sz="1400" kern="1200" dirty="0">
+              <a:latin typeface="Microsoft JhengHei" panose="020B0604030504040204" pitchFamily="34" charset="-120"/>
+              <a:ea typeface="Microsoft JhengHei" panose="020B0604030504040204" pitchFamily="34" charset="-120"/>
+            </a:rPr>
+          </a:br>
+          <a:r>
+            <a:rPr lang="zh-TW" altLang="en-US" sz="1400" kern="1200" dirty="0">
+              <a:latin typeface="Microsoft JhengHei" panose="020B0604030504040204" pitchFamily="34" charset="-120"/>
+              <a:ea typeface="Microsoft JhengHei" panose="020B0604030504040204" pitchFamily="34" charset="-120"/>
+            </a:rPr>
+            <a:t>產出相似度報告與關鍵字建議</a:t>
           </a:r>
         </a:p>
       </dsp:txBody>
@@ -3183,7 +3287,40 @@
               <a:latin typeface="Microsoft JhengHei" panose="020B0604030504040204" pitchFamily="34" charset="-120"/>
               <a:ea typeface="Microsoft JhengHei" panose="020B0604030504040204" pitchFamily="34" charset="-120"/>
             </a:rPr>
-            <a:t>產出相似度報告與關鍵字建議</a:t>
+            <a:t>結合</a:t>
+          </a:r>
+          <a:r>
+            <a:rPr lang="en-US" altLang="zh-TW" sz="1400" kern="1200" dirty="0">
+              <a:latin typeface="Microsoft JhengHei" panose="020B0604030504040204" pitchFamily="34" charset="-120"/>
+              <a:ea typeface="Microsoft JhengHei" panose="020B0604030504040204" pitchFamily="34" charset="-120"/>
+            </a:rPr>
+            <a:t>Open AI API</a:t>
+          </a:r>
+          <a:br>
+            <a:rPr lang="en-US" altLang="zh-TW" sz="1400" kern="1200" dirty="0">
+              <a:latin typeface="Microsoft JhengHei" panose="020B0604030504040204" pitchFamily="34" charset="-120"/>
+              <a:ea typeface="Microsoft JhengHei" panose="020B0604030504040204" pitchFamily="34" charset="-120"/>
+            </a:rPr>
+          </a:br>
+          <a:r>
+            <a:rPr lang="zh-TW" altLang="en-US" sz="1400" kern="1200" dirty="0">
+              <a:latin typeface="Microsoft JhengHei" panose="020B0604030504040204" pitchFamily="34" charset="-120"/>
+              <a:ea typeface="Microsoft JhengHei" panose="020B0604030504040204" pitchFamily="34" charset="-120"/>
+            </a:rPr>
+            <a:t>自動生成</a:t>
+          </a:r>
+          <a:br>
+            <a:rPr lang="en-US" altLang="zh-TW" sz="1400" kern="1200" dirty="0">
+              <a:latin typeface="Microsoft JhengHei" panose="020B0604030504040204" pitchFamily="34" charset="-120"/>
+              <a:ea typeface="Microsoft JhengHei" panose="020B0604030504040204" pitchFamily="34" charset="-120"/>
+            </a:rPr>
+          </a:br>
+          <a:r>
+            <a:rPr lang="zh-TW" altLang="en-US" sz="1400" kern="1200" dirty="0">
+              <a:latin typeface="Microsoft JhengHei" panose="020B0604030504040204" pitchFamily="34" charset="-120"/>
+              <a:ea typeface="Microsoft JhengHei" panose="020B0604030504040204" pitchFamily="34" charset="-120"/>
+            </a:rPr>
+            <a:t>客製化優質文稿</a:t>
           </a:r>
         </a:p>
       </dsp:txBody>
@@ -4548,7 +4685,7 @@
           <a:p>
             <a:fld id="{70AA65B9-29B5-2D42-B49D-57F573DFB96B}" type="datetimeFigureOut">
               <a:rPr kumimoji="1" lang="zh-TW" altLang="en-US" smtClean="0"/>
-              <a:t>2023/9/25</a:t>
+              <a:t>2023/9/26</a:t>
             </a:fld>
             <a:endParaRPr kumimoji="1" lang="zh-TW" altLang="en-US"/>
           </a:p>
@@ -4746,7 +4883,7 @@
           <a:p>
             <a:fld id="{70AA65B9-29B5-2D42-B49D-57F573DFB96B}" type="datetimeFigureOut">
               <a:rPr kumimoji="1" lang="zh-TW" altLang="en-US" smtClean="0"/>
-              <a:t>2023/9/25</a:t>
+              <a:t>2023/9/26</a:t>
             </a:fld>
             <a:endParaRPr kumimoji="1" lang="zh-TW" altLang="en-US"/>
           </a:p>
@@ -4954,7 +5091,7 @@
           <a:p>
             <a:fld id="{70AA65B9-29B5-2D42-B49D-57F573DFB96B}" type="datetimeFigureOut">
               <a:rPr kumimoji="1" lang="zh-TW" altLang="en-US" smtClean="0"/>
-              <a:t>2023/9/25</a:t>
+              <a:t>2023/9/26</a:t>
             </a:fld>
             <a:endParaRPr kumimoji="1" lang="zh-TW" altLang="en-US"/>
           </a:p>
@@ -5152,7 +5289,7 @@
           <a:p>
             <a:fld id="{70AA65B9-29B5-2D42-B49D-57F573DFB96B}" type="datetimeFigureOut">
               <a:rPr kumimoji="1" lang="zh-TW" altLang="en-US" smtClean="0"/>
-              <a:t>2023/9/25</a:t>
+              <a:t>2023/9/26</a:t>
             </a:fld>
             <a:endParaRPr kumimoji="1" lang="zh-TW" altLang="en-US"/>
           </a:p>
@@ -5427,7 +5564,7 @@
           <a:p>
             <a:fld id="{70AA65B9-29B5-2D42-B49D-57F573DFB96B}" type="datetimeFigureOut">
               <a:rPr kumimoji="1" lang="zh-TW" altLang="en-US" smtClean="0"/>
-              <a:t>2023/9/25</a:t>
+              <a:t>2023/9/26</a:t>
             </a:fld>
             <a:endParaRPr kumimoji="1" lang="zh-TW" altLang="en-US"/>
           </a:p>
@@ -5692,7 +5829,7 @@
           <a:p>
             <a:fld id="{70AA65B9-29B5-2D42-B49D-57F573DFB96B}" type="datetimeFigureOut">
               <a:rPr kumimoji="1" lang="zh-TW" altLang="en-US" smtClean="0"/>
-              <a:t>2023/9/25</a:t>
+              <a:t>2023/9/26</a:t>
             </a:fld>
             <a:endParaRPr kumimoji="1" lang="zh-TW" altLang="en-US"/>
           </a:p>
@@ -6104,7 +6241,7 @@
           <a:p>
             <a:fld id="{70AA65B9-29B5-2D42-B49D-57F573DFB96B}" type="datetimeFigureOut">
               <a:rPr kumimoji="1" lang="zh-TW" altLang="en-US" smtClean="0"/>
-              <a:t>2023/9/25</a:t>
+              <a:t>2023/9/26</a:t>
             </a:fld>
             <a:endParaRPr kumimoji="1" lang="zh-TW" altLang="en-US"/>
           </a:p>
@@ -6245,7 +6382,7 @@
           <a:p>
             <a:fld id="{70AA65B9-29B5-2D42-B49D-57F573DFB96B}" type="datetimeFigureOut">
               <a:rPr kumimoji="1" lang="zh-TW" altLang="en-US" smtClean="0"/>
-              <a:t>2023/9/25</a:t>
+              <a:t>2023/9/26</a:t>
             </a:fld>
             <a:endParaRPr kumimoji="1" lang="zh-TW" altLang="en-US"/>
           </a:p>
@@ -6358,7 +6495,7 @@
           <a:p>
             <a:fld id="{70AA65B9-29B5-2D42-B49D-57F573DFB96B}" type="datetimeFigureOut">
               <a:rPr kumimoji="1" lang="zh-TW" altLang="en-US" smtClean="0"/>
-              <a:t>2023/9/25</a:t>
+              <a:t>2023/9/26</a:t>
             </a:fld>
             <a:endParaRPr kumimoji="1" lang="zh-TW" altLang="en-US"/>
           </a:p>
@@ -6669,7 +6806,7 @@
           <a:p>
             <a:fld id="{70AA65B9-29B5-2D42-B49D-57F573DFB96B}" type="datetimeFigureOut">
               <a:rPr kumimoji="1" lang="zh-TW" altLang="en-US" smtClean="0"/>
-              <a:t>2023/9/25</a:t>
+              <a:t>2023/9/26</a:t>
             </a:fld>
             <a:endParaRPr kumimoji="1" lang="zh-TW" altLang="en-US"/>
           </a:p>
@@ -6957,7 +7094,7 @@
           <a:p>
             <a:fld id="{70AA65B9-29B5-2D42-B49D-57F573DFB96B}" type="datetimeFigureOut">
               <a:rPr kumimoji="1" lang="zh-TW" altLang="en-US" smtClean="0"/>
-              <a:t>2023/9/25</a:t>
+              <a:t>2023/9/26</a:t>
             </a:fld>
             <a:endParaRPr kumimoji="1" lang="zh-TW" altLang="en-US"/>
           </a:p>
@@ -7198,7 +7335,7 @@
           <a:p>
             <a:fld id="{70AA65B9-29B5-2D42-B49D-57F573DFB96B}" type="datetimeFigureOut">
               <a:rPr kumimoji="1" lang="zh-TW" altLang="en-US" smtClean="0"/>
-              <a:t>2023/9/25</a:t>
+              <a:t>2023/9/26</a:t>
             </a:fld>
             <a:endParaRPr kumimoji="1" lang="zh-TW" altLang="en-US"/>
           </a:p>
@@ -7615,781 +7752,662 @@
           <a:chExt cx="0" cy="0"/>
         </a:xfrm>
       </p:grpSpPr>
-      <p:grpSp>
-        <p:nvGrpSpPr>
-          <p:cNvPr id="8" name="群組 7">
+      <p:pic>
+        <p:nvPicPr>
+          <p:cNvPr id="1028" name="Picture 4" descr="网络爬虫图片-网络爬虫素材-网络爬虫插画-摄图新视界">
             <a:extLst>
               <a:ext uri="{FF2B5EF4-FFF2-40B4-BE49-F238E27FC236}">
-                <a16:creationId xmlns:a16="http://schemas.microsoft.com/office/drawing/2014/main" id="{E25F569B-D786-FBEB-AA2E-28E1D7DC0D5E}"/>
+                <a16:creationId xmlns:a16="http://schemas.microsoft.com/office/drawing/2014/main" id="{B1342231-62D3-A03D-5F0B-A39125DDA836}"/>
               </a:ext>
             </a:extLst>
           </p:cNvPr>
-          <p:cNvGrpSpPr/>
+          <p:cNvPicPr>
+            <a:picLocks noChangeAspect="1" noChangeArrowheads="1"/>
+          </p:cNvPicPr>
           <p:nvPr/>
-        </p:nvGrpSpPr>
-        <p:grpSpPr>
+        </p:nvPicPr>
+        <p:blipFill>
+          <a:blip r:embed="rId2">
+            <a:extLst>
+              <a:ext uri="{28A0092B-C50C-407E-A947-70E740481C1C}">
+                <a14:useLocalDpi xmlns:a14="http://schemas.microsoft.com/office/drawing/2010/main" val="0"/>
+              </a:ext>
+            </a:extLst>
+          </a:blip>
+          <a:srcRect/>
+          <a:stretch>
+            <a:fillRect/>
+          </a:stretch>
+        </p:blipFill>
+        <p:spPr bwMode="auto">
           <a:xfrm>
-            <a:off x="2386507" y="160020"/>
-            <a:ext cx="7720313" cy="6345259"/>
-            <a:chOff x="2386507" y="0"/>
-            <a:chExt cx="7720313" cy="6345259"/>
+            <a:off x="8166613" y="1087367"/>
+            <a:ext cx="1112424" cy="1170973"/>
           </a:xfrm>
-        </p:grpSpPr>
-        <p:pic>
-          <p:nvPicPr>
-            <p:cNvPr id="1028" name="Picture 4" descr="网络爬虫图片-网络爬虫素材-网络爬虫插画-摄图新视界">
-              <a:extLst>
-                <a:ext uri="{FF2B5EF4-FFF2-40B4-BE49-F238E27FC236}">
-                  <a16:creationId xmlns:a16="http://schemas.microsoft.com/office/drawing/2014/main" id="{B1342231-62D3-A03D-5F0B-A39125DDA836}"/>
-                </a:ext>
-              </a:extLst>
-            </p:cNvPr>
-            <p:cNvPicPr>
-              <a:picLocks noChangeAspect="1" noChangeArrowheads="1"/>
-            </p:cNvPicPr>
-            <p:nvPr/>
-          </p:nvPicPr>
-          <p:blipFill>
-            <a:blip r:embed="rId2">
-              <a:extLst>
-                <a:ext uri="{28A0092B-C50C-407E-A947-70E740481C1C}">
-                  <a14:useLocalDpi xmlns:a14="http://schemas.microsoft.com/office/drawing/2010/main" val="0"/>
-                </a:ext>
-              </a:extLst>
-            </a:blip>
-            <a:srcRect/>
-            <a:stretch>
-              <a:fillRect/>
-            </a:stretch>
-          </p:blipFill>
-          <p:spPr bwMode="auto">
-            <a:xfrm>
-              <a:off x="8166613" y="830997"/>
-              <a:ext cx="1112424" cy="1170973"/>
-            </a:xfrm>
-            <a:prstGeom prst="rect">
-              <a:avLst/>
-            </a:prstGeom>
-            <a:noFill/>
-            <a:extLst>
-              <a:ext uri="{909E8E84-426E-40DD-AFC4-6F175D3DCCD1}">
-                <a14:hiddenFill xmlns:a14="http://schemas.microsoft.com/office/drawing/2010/main">
-                  <a:solidFill>
-                    <a:srgbClr val="FFFFFF"/>
-                  </a:solidFill>
-                </a14:hiddenFill>
-              </a:ext>
-            </a:extLst>
-          </p:spPr>
-        </p:pic>
-        <p:sp>
-          <p:nvSpPr>
-            <p:cNvPr id="2" name="文字方塊 1">
-              <a:extLst>
-                <a:ext uri="{FF2B5EF4-FFF2-40B4-BE49-F238E27FC236}">
-                  <a16:creationId xmlns:a16="http://schemas.microsoft.com/office/drawing/2014/main" id="{E7F65BD4-3B33-4DC9-6DE8-3D3A0D669AAB}"/>
-                </a:ext>
-              </a:extLst>
-            </p:cNvPr>
-            <p:cNvSpPr txBox="1"/>
-            <p:nvPr/>
-          </p:nvSpPr>
-          <p:spPr>
-            <a:xfrm>
-              <a:off x="2912962" y="0"/>
-              <a:ext cx="6366075" cy="830997"/>
-            </a:xfrm>
-            <a:prstGeom prst="rect">
-              <a:avLst/>
-            </a:prstGeom>
-            <a:noFill/>
-          </p:spPr>
-          <p:txBody>
-            <a:bodyPr wrap="square" rtlCol="0">
-              <a:spAutoFit/>
-            </a:bodyPr>
-            <a:lstStyle/>
-            <a:p>
-              <a:pPr algn="ctr"/>
-              <a:r>
-                <a:rPr kumimoji="1" lang="zh-TW" altLang="en-US" sz="4800" b="1" u="sng" dirty="0">
-                  <a:latin typeface="Microsoft JhengHei" panose="020B0604030504040204" pitchFamily="34" charset="-120"/>
-                  <a:ea typeface="Microsoft JhengHei" panose="020B0604030504040204" pitchFamily="34" charset="-120"/>
-                </a:rPr>
-                <a:t>關鍵字推薦系統</a:t>
-              </a:r>
-            </a:p>
-          </p:txBody>
-        </p:sp>
-        <p:graphicFrame>
-          <p:nvGraphicFramePr>
-            <p:cNvPr id="5" name="資料庫圖表 4">
-              <a:extLst>
-                <a:ext uri="{FF2B5EF4-FFF2-40B4-BE49-F238E27FC236}">
-                  <a16:creationId xmlns:a16="http://schemas.microsoft.com/office/drawing/2014/main" id="{C6FD20FC-5EE4-0EB5-8631-564E64796AFC}"/>
-                </a:ext>
-              </a:extLst>
-            </p:cNvPr>
-            <p:cNvGraphicFramePr/>
-            <p:nvPr>
-              <p:extLst>
-                <p:ext uri="{D42A27DB-BD31-4B8C-83A1-F6EECF244321}">
-                  <p14:modId xmlns:p14="http://schemas.microsoft.com/office/powerpoint/2010/main" val="1578252647"/>
-                </p:ext>
-              </p:extLst>
-            </p:nvPr>
-          </p:nvGraphicFramePr>
-          <p:xfrm>
-            <a:off x="2386507" y="1769508"/>
-            <a:ext cx="7720313" cy="4575751"/>
-          </p:xfrm>
-          <a:graphic>
-            <a:graphicData uri="http://schemas.openxmlformats.org/drawingml/2006/diagram">
-              <dgm:relIds xmlns:dgm="http://schemas.openxmlformats.org/drawingml/2006/diagram" xmlns:r="http://schemas.openxmlformats.org/officeDocument/2006/relationships" r:dm="rId3" r:lo="rId4" r:qs="rId5" r:cs="rId6"/>
-            </a:graphicData>
-          </a:graphic>
-        </p:graphicFrame>
-        <p:pic>
-          <p:nvPicPr>
-            <p:cNvPr id="1026" name="Picture 2" descr="How to Do Keyword Research – SEO Trends of 2021">
-              <a:extLst>
-                <a:ext uri="{FF2B5EF4-FFF2-40B4-BE49-F238E27FC236}">
-                  <a16:creationId xmlns:a16="http://schemas.microsoft.com/office/drawing/2014/main" id="{D9CED916-48B1-93F3-5D4A-9B562355D267}"/>
-                </a:ext>
-              </a:extLst>
-            </p:cNvPr>
-            <p:cNvPicPr>
-              <a:picLocks noChangeAspect="1" noChangeArrowheads="1"/>
-            </p:cNvPicPr>
-            <p:nvPr/>
-          </p:nvPicPr>
-          <p:blipFill>
-            <a:blip r:embed="rId8">
-              <a:extLst>
-                <a:ext uri="{28A0092B-C50C-407E-A947-70E740481C1C}">
-                  <a14:useLocalDpi xmlns:a14="http://schemas.microsoft.com/office/drawing/2010/main" val="0"/>
-                </a:ext>
-              </a:extLst>
-            </a:blip>
-            <a:srcRect/>
-            <a:stretch>
-              <a:fillRect/>
-            </a:stretch>
-          </p:blipFill>
-          <p:spPr bwMode="auto">
-            <a:xfrm>
-              <a:off x="5366518" y="971258"/>
-              <a:ext cx="1760290" cy="925572"/>
-            </a:xfrm>
-            <a:prstGeom prst="rect">
-              <a:avLst/>
-            </a:prstGeom>
-            <a:noFill/>
-            <a:extLst>
-              <a:ext uri="{909E8E84-426E-40DD-AFC4-6F175D3DCCD1}">
-                <a14:hiddenFill xmlns:a14="http://schemas.microsoft.com/office/drawing/2010/main">
-                  <a:solidFill>
-                    <a:srgbClr val="FFFFFF"/>
-                  </a:solidFill>
-                </a14:hiddenFill>
-              </a:ext>
-            </a:extLst>
-          </p:spPr>
-        </p:pic>
-        <p:pic>
-          <p:nvPicPr>
-            <p:cNvPr id="4" name="圖片 3">
-              <a:extLst>
-                <a:ext uri="{FF2B5EF4-FFF2-40B4-BE49-F238E27FC236}">
-                  <a16:creationId xmlns:a16="http://schemas.microsoft.com/office/drawing/2014/main" id="{9E24F8F6-AE2F-EA6C-A9FA-101051E002AD}"/>
-                </a:ext>
-              </a:extLst>
-            </p:cNvPr>
-            <p:cNvPicPr>
-              <a:picLocks noChangeAspect="1"/>
-            </p:cNvPicPr>
-            <p:nvPr/>
-          </p:nvPicPr>
-          <p:blipFill rotWithShape="1">
-            <a:blip r:embed="rId9"/>
-            <a:srcRect r="7674"/>
-            <a:stretch/>
-          </p:blipFill>
-          <p:spPr>
-            <a:xfrm>
-              <a:off x="2912962" y="971257"/>
-              <a:ext cx="1760290" cy="890455"/>
-            </a:xfrm>
-            <a:prstGeom prst="rect">
-              <a:avLst/>
-            </a:prstGeom>
-          </p:spPr>
-        </p:pic>
-        <p:pic>
-          <p:nvPicPr>
-            <p:cNvPr id="1030" name="Picture 6" descr="Video - Free marketing icons">
-              <a:extLst>
-                <a:ext uri="{FF2B5EF4-FFF2-40B4-BE49-F238E27FC236}">
-                  <a16:creationId xmlns:a16="http://schemas.microsoft.com/office/drawing/2014/main" id="{05997CD1-A576-9BE2-54CB-B69357B37BAA}"/>
-                </a:ext>
-              </a:extLst>
-            </p:cNvPr>
-            <p:cNvPicPr>
-              <a:picLocks noChangeAspect="1" noChangeArrowheads="1"/>
-            </p:cNvPicPr>
-            <p:nvPr/>
-          </p:nvPicPr>
-          <p:blipFill>
-            <a:blip r:embed="rId10">
-              <a:extLst>
-                <a:ext uri="{28A0092B-C50C-407E-A947-70E740481C1C}">
-                  <a14:useLocalDpi xmlns:a14="http://schemas.microsoft.com/office/drawing/2010/main" val="0"/>
-                </a:ext>
-              </a:extLst>
-            </a:blip>
-            <a:srcRect/>
-            <a:stretch>
-              <a:fillRect/>
-            </a:stretch>
-          </p:blipFill>
-          <p:spPr bwMode="auto">
-            <a:xfrm>
-              <a:off x="7908476" y="2940481"/>
-              <a:ext cx="516273" cy="516273"/>
-            </a:xfrm>
-            <a:prstGeom prst="rect">
-              <a:avLst/>
-            </a:prstGeom>
-            <a:noFill/>
-            <a:extLst>
-              <a:ext uri="{909E8E84-426E-40DD-AFC4-6F175D3DCCD1}">
-                <a14:hiddenFill xmlns:a14="http://schemas.microsoft.com/office/drawing/2010/main">
-                  <a:solidFill>
-                    <a:srgbClr val="FFFFFF"/>
-                  </a:solidFill>
-                </a14:hiddenFill>
-              </a:ext>
-            </a:extLst>
-          </p:spPr>
-        </p:pic>
-        <p:pic>
-          <p:nvPicPr>
-            <p:cNvPr id="1032" name="Picture 8" descr="Txt text file extension symbol - Free interface icons">
-              <a:extLst>
-                <a:ext uri="{FF2B5EF4-FFF2-40B4-BE49-F238E27FC236}">
-                  <a16:creationId xmlns:a16="http://schemas.microsoft.com/office/drawing/2014/main" id="{F0B1E37E-A961-A346-E2F5-B179E56DFA73}"/>
-                </a:ext>
-              </a:extLst>
-            </p:cNvPr>
-            <p:cNvPicPr>
-              <a:picLocks noChangeAspect="1" noChangeArrowheads="1"/>
-            </p:cNvPicPr>
-            <p:nvPr/>
-          </p:nvPicPr>
-          <p:blipFill>
-            <a:blip r:embed="rId11">
-              <a:extLst>
-                <a:ext uri="{28A0092B-C50C-407E-A947-70E740481C1C}">
-                  <a14:useLocalDpi xmlns:a14="http://schemas.microsoft.com/office/drawing/2010/main" val="0"/>
-                </a:ext>
-              </a:extLst>
-            </a:blip>
-            <a:srcRect/>
-            <a:stretch>
-              <a:fillRect/>
-            </a:stretch>
-          </p:blipFill>
-          <p:spPr bwMode="auto">
-            <a:xfrm>
-              <a:off x="8948631" y="2947594"/>
-              <a:ext cx="516273" cy="516273"/>
-            </a:xfrm>
-            <a:prstGeom prst="rect">
-              <a:avLst/>
-            </a:prstGeom>
-            <a:noFill/>
-            <a:extLst>
-              <a:ext uri="{909E8E84-426E-40DD-AFC4-6F175D3DCCD1}">
-                <a14:hiddenFill xmlns:a14="http://schemas.microsoft.com/office/drawing/2010/main">
-                  <a:solidFill>
-                    <a:srgbClr val="FFFFFF"/>
-                  </a:solidFill>
-                </a14:hiddenFill>
-              </a:ext>
-            </a:extLst>
-          </p:spPr>
-        </p:pic>
-        <p:pic>
-          <p:nvPicPr>
-            <p:cNvPr id="1034" name="Picture 10" descr="GitHub - Lei-Cai/NLP-jieba: 结巴中文分词">
-              <a:extLst>
-                <a:ext uri="{FF2B5EF4-FFF2-40B4-BE49-F238E27FC236}">
-                  <a16:creationId xmlns:a16="http://schemas.microsoft.com/office/drawing/2014/main" id="{CB0187F0-7767-8229-44F2-DFDB42E967F7}"/>
-                </a:ext>
-              </a:extLst>
-            </p:cNvPr>
-            <p:cNvPicPr>
-              <a:picLocks noChangeAspect="1" noChangeArrowheads="1"/>
-            </p:cNvPicPr>
-            <p:nvPr/>
-          </p:nvPicPr>
-          <p:blipFill rotWithShape="1">
-            <a:blip r:embed="rId12">
-              <a:extLst>
-                <a:ext uri="{28A0092B-C50C-407E-A947-70E740481C1C}">
-                  <a14:useLocalDpi xmlns:a14="http://schemas.microsoft.com/office/drawing/2010/main" val="0"/>
-                </a:ext>
-              </a:extLst>
-            </a:blip>
-            <a:srcRect b="41342"/>
-            <a:stretch/>
-          </p:blipFill>
-          <p:spPr bwMode="auto">
-            <a:xfrm>
-              <a:off x="5366518" y="3060032"/>
-              <a:ext cx="1760290" cy="516274"/>
-            </a:xfrm>
-            <a:prstGeom prst="rect">
-              <a:avLst/>
-            </a:prstGeom>
-            <a:noFill/>
-            <a:extLst>
-              <a:ext uri="{909E8E84-426E-40DD-AFC4-6F175D3DCCD1}">
-                <a14:hiddenFill xmlns:a14="http://schemas.microsoft.com/office/drawing/2010/main">
-                  <a:solidFill>
-                    <a:srgbClr val="FFFFFF"/>
-                  </a:solidFill>
-                </a14:hiddenFill>
-              </a:ext>
-            </a:extLst>
-          </p:spPr>
-        </p:pic>
-        <p:pic>
-          <p:nvPicPr>
-            <p:cNvPr id="1036" name="Picture 12" descr="Comment utiliser TF-IDF pour le référencement">
-              <a:extLst>
-                <a:ext uri="{FF2B5EF4-FFF2-40B4-BE49-F238E27FC236}">
-                  <a16:creationId xmlns:a16="http://schemas.microsoft.com/office/drawing/2014/main" id="{96F0E6B5-5B2C-C4CB-8B37-A8FAE9CC55F2}"/>
-                </a:ext>
-              </a:extLst>
-            </p:cNvPr>
-            <p:cNvPicPr>
-              <a:picLocks noChangeAspect="1" noChangeArrowheads="1"/>
-            </p:cNvPicPr>
-            <p:nvPr/>
-          </p:nvPicPr>
-          <p:blipFill rotWithShape="1">
-            <a:blip r:embed="rId13">
-              <a:extLst>
-                <a:ext uri="{28A0092B-C50C-407E-A947-70E740481C1C}">
-                  <a14:useLocalDpi xmlns:a14="http://schemas.microsoft.com/office/drawing/2010/main" val="0"/>
-                </a:ext>
-              </a:extLst>
-            </a:blip>
-            <a:srcRect l="446" t="12648" r="-446" b="25322"/>
-            <a:stretch/>
-          </p:blipFill>
-          <p:spPr bwMode="auto">
-            <a:xfrm>
-              <a:off x="3206601" y="2982461"/>
-              <a:ext cx="1173011" cy="481406"/>
-            </a:xfrm>
-            <a:prstGeom prst="rect">
-              <a:avLst/>
-            </a:prstGeom>
-            <a:noFill/>
-            <a:extLst>
-              <a:ext uri="{909E8E84-426E-40DD-AFC4-6F175D3DCCD1}">
-                <a14:hiddenFill xmlns:a14="http://schemas.microsoft.com/office/drawing/2010/main">
-                  <a:solidFill>
-                    <a:srgbClr val="FFFFFF"/>
-                  </a:solidFill>
-                </a14:hiddenFill>
-              </a:ext>
-            </a:extLst>
-          </p:spPr>
-        </p:pic>
-        <p:pic>
-          <p:nvPicPr>
-            <p:cNvPr id="1038" name="Picture 14" descr="Article Icon Vector Art, Icons, and Graphics for Free Download">
-              <a:extLst>
-                <a:ext uri="{FF2B5EF4-FFF2-40B4-BE49-F238E27FC236}">
-                  <a16:creationId xmlns:a16="http://schemas.microsoft.com/office/drawing/2014/main" id="{2FE0BFE9-6319-BE8C-3E44-510DEB1B2CF8}"/>
-                </a:ext>
-              </a:extLst>
-            </p:cNvPr>
-            <p:cNvPicPr>
-              <a:picLocks noChangeAspect="1" noChangeArrowheads="1"/>
-            </p:cNvPicPr>
-            <p:nvPr/>
-          </p:nvPicPr>
-          <p:blipFill>
-            <a:blip r:embed="rId14">
-              <a:extLst>
-                <a:ext uri="{28A0092B-C50C-407E-A947-70E740481C1C}">
-                  <a14:useLocalDpi xmlns:a14="http://schemas.microsoft.com/office/drawing/2010/main" val="0"/>
-                </a:ext>
-              </a:extLst>
-            </a:blip>
-            <a:srcRect/>
-            <a:stretch>
-              <a:fillRect/>
-            </a:stretch>
-          </p:blipFill>
-          <p:spPr bwMode="auto">
-            <a:xfrm>
-              <a:off x="5366518" y="4608879"/>
-              <a:ext cx="594444" cy="594444"/>
-            </a:xfrm>
-            <a:prstGeom prst="rect">
-              <a:avLst/>
-            </a:prstGeom>
-            <a:noFill/>
-            <a:extLst>
-              <a:ext uri="{909E8E84-426E-40DD-AFC4-6F175D3DCCD1}">
-                <a14:hiddenFill xmlns:a14="http://schemas.microsoft.com/office/drawing/2010/main">
-                  <a:solidFill>
-                    <a:srgbClr val="FFFFFF"/>
-                  </a:solidFill>
-                </a14:hiddenFill>
-              </a:ext>
-            </a:extLst>
-          </p:spPr>
-        </p:pic>
-        <p:pic>
-          <p:nvPicPr>
-            <p:cNvPr id="1040" name="Picture 16" descr="Article - Free interface icons">
-              <a:extLst>
-                <a:ext uri="{FF2B5EF4-FFF2-40B4-BE49-F238E27FC236}">
-                  <a16:creationId xmlns:a16="http://schemas.microsoft.com/office/drawing/2014/main" id="{416D54DF-68FB-9FFA-42BD-EB61E4B66155}"/>
-                </a:ext>
-              </a:extLst>
-            </p:cNvPr>
-            <p:cNvPicPr>
-              <a:picLocks noChangeAspect="1" noChangeArrowheads="1"/>
-            </p:cNvPicPr>
-            <p:nvPr/>
-          </p:nvPicPr>
-          <p:blipFill>
-            <a:blip r:embed="rId15">
-              <a:extLst>
-                <a:ext uri="{28A0092B-C50C-407E-A947-70E740481C1C}">
-                  <a14:useLocalDpi xmlns:a14="http://schemas.microsoft.com/office/drawing/2010/main" val="0"/>
-                </a:ext>
-              </a:extLst>
-            </a:blip>
-            <a:srcRect/>
-            <a:stretch>
-              <a:fillRect/>
-            </a:stretch>
-          </p:blipFill>
-          <p:spPr bwMode="auto">
-            <a:xfrm>
-              <a:off x="6472834" y="4591640"/>
-              <a:ext cx="594445" cy="594445"/>
-            </a:xfrm>
-            <a:prstGeom prst="rect">
-              <a:avLst/>
-            </a:prstGeom>
-            <a:noFill/>
-            <a:extLst>
-              <a:ext uri="{909E8E84-426E-40DD-AFC4-6F175D3DCCD1}">
-                <a14:hiddenFill xmlns:a14="http://schemas.microsoft.com/office/drawing/2010/main">
-                  <a:solidFill>
-                    <a:srgbClr val="FFFFFF"/>
-                  </a:solidFill>
-                </a14:hiddenFill>
-              </a:ext>
-            </a:extLst>
-          </p:spPr>
-        </p:pic>
-        <p:sp>
-          <p:nvSpPr>
-            <p:cNvPr id="7" name="十字形 6">
-              <a:extLst>
-                <a:ext uri="{FF2B5EF4-FFF2-40B4-BE49-F238E27FC236}">
-                  <a16:creationId xmlns:a16="http://schemas.microsoft.com/office/drawing/2014/main" id="{41E35E78-E364-FFA1-0869-0D2137BFAFFC}"/>
-                </a:ext>
-              </a:extLst>
-            </p:cNvPr>
-            <p:cNvSpPr/>
-            <p:nvPr/>
-          </p:nvSpPr>
-          <p:spPr>
-            <a:xfrm rot="2700000">
-              <a:off x="6045382" y="4717346"/>
-              <a:ext cx="343032" cy="343032"/>
-            </a:xfrm>
-            <a:prstGeom prst="plus">
-              <a:avLst>
-                <a:gd name="adj" fmla="val 40550"/>
-              </a:avLst>
-            </a:prstGeom>
-            <a:solidFill>
-              <a:srgbClr val="FF0000"/>
-            </a:solidFill>
-          </p:spPr>
-          <p:style>
-            <a:lnRef idx="2">
-              <a:schemeClr val="accent1">
-                <a:shade val="50000"/>
-              </a:schemeClr>
-            </a:lnRef>
-            <a:fillRef idx="1">
-              <a:schemeClr val="accent1"/>
-            </a:fillRef>
-            <a:effectRef idx="0">
-              <a:schemeClr val="accent1"/>
-            </a:effectRef>
-            <a:fontRef idx="minor">
-              <a:schemeClr val="lt1"/>
-            </a:fontRef>
-          </p:style>
-          <p:txBody>
-            <a:bodyPr rtlCol="0" anchor="ctr"/>
-            <a:lstStyle/>
-            <a:p>
-              <a:pPr algn="ctr"/>
-              <a:endParaRPr kumimoji="1" lang="zh-TW" altLang="en-US"/>
-            </a:p>
-          </p:txBody>
-        </p:sp>
-        <p:pic>
-          <p:nvPicPr>
-            <p:cNvPr id="1042" name="Picture 18" descr="Ranking - Free seo and web icons">
-              <a:extLst>
-                <a:ext uri="{FF2B5EF4-FFF2-40B4-BE49-F238E27FC236}">
-                  <a16:creationId xmlns:a16="http://schemas.microsoft.com/office/drawing/2014/main" id="{F8ED74AC-3206-4EB6-5F29-07A95D71B0E4}"/>
-                </a:ext>
-              </a:extLst>
-            </p:cNvPr>
-            <p:cNvPicPr>
-              <a:picLocks noChangeAspect="1" noChangeArrowheads="1"/>
-            </p:cNvPicPr>
-            <p:nvPr/>
-          </p:nvPicPr>
-          <p:blipFill>
-            <a:blip r:embed="rId16">
-              <a:extLst>
-                <a:ext uri="{28A0092B-C50C-407E-A947-70E740481C1C}">
-                  <a14:useLocalDpi xmlns:a14="http://schemas.microsoft.com/office/drawing/2010/main" val="0"/>
-                </a:ext>
-              </a:extLst>
-            </a:blip>
-            <a:srcRect/>
-            <a:stretch>
-              <a:fillRect/>
-            </a:stretch>
-          </p:blipFill>
-          <p:spPr bwMode="auto">
-            <a:xfrm>
-              <a:off x="4023579" y="4646301"/>
-              <a:ext cx="594445" cy="594445"/>
-            </a:xfrm>
-            <a:prstGeom prst="rect">
-              <a:avLst/>
-            </a:prstGeom>
-            <a:noFill/>
-            <a:extLst>
-              <a:ext uri="{909E8E84-426E-40DD-AFC4-6F175D3DCCD1}">
-                <a14:hiddenFill xmlns:a14="http://schemas.microsoft.com/office/drawing/2010/main">
-                  <a:solidFill>
-                    <a:srgbClr val="FFFFFF"/>
-                  </a:solidFill>
-                </a14:hiddenFill>
-              </a:ext>
-            </a:extLst>
-          </p:spPr>
-        </p:pic>
-        <p:pic>
-          <p:nvPicPr>
-            <p:cNvPr id="1044" name="Picture 20" descr="Keyword Research Icon PNG Images, Vectors Free Download - Pngtree">
-              <a:extLst>
-                <a:ext uri="{FF2B5EF4-FFF2-40B4-BE49-F238E27FC236}">
-                  <a16:creationId xmlns:a16="http://schemas.microsoft.com/office/drawing/2014/main" id="{4E8B475F-A1C9-F6B5-618D-E761FF2C9FBE}"/>
-                </a:ext>
-              </a:extLst>
-            </p:cNvPr>
-            <p:cNvPicPr>
-              <a:picLocks noChangeAspect="1" noChangeArrowheads="1"/>
-            </p:cNvPicPr>
-            <p:nvPr/>
-          </p:nvPicPr>
-          <p:blipFill>
-            <a:blip r:embed="rId17">
-              <a:extLst>
-                <a:ext uri="{28A0092B-C50C-407E-A947-70E740481C1C}">
-                  <a14:useLocalDpi xmlns:a14="http://schemas.microsoft.com/office/drawing/2010/main" val="0"/>
-                </a:ext>
-              </a:extLst>
-            </a:blip>
-            <a:srcRect/>
-            <a:stretch>
-              <a:fillRect/>
-            </a:stretch>
-          </p:blipFill>
-          <p:spPr bwMode="auto">
-            <a:xfrm>
-              <a:off x="2977862" y="4646300"/>
-              <a:ext cx="594446" cy="594446"/>
-            </a:xfrm>
-            <a:prstGeom prst="rect">
-              <a:avLst/>
-            </a:prstGeom>
-            <a:noFill/>
-            <a:extLst>
-              <a:ext uri="{909E8E84-426E-40DD-AFC4-6F175D3DCCD1}">
-                <a14:hiddenFill xmlns:a14="http://schemas.microsoft.com/office/drawing/2010/main">
-                  <a:solidFill>
-                    <a:srgbClr val="FFFFFF"/>
-                  </a:solidFill>
-                </a14:hiddenFill>
-              </a:ext>
-            </a:extLst>
-          </p:spPr>
-        </p:pic>
-        <p:pic>
-          <p:nvPicPr>
-            <p:cNvPr id="1046" name="Picture 22" descr="Report - Free seo and web icons">
-              <a:extLst>
-                <a:ext uri="{FF2B5EF4-FFF2-40B4-BE49-F238E27FC236}">
-                  <a16:creationId xmlns:a16="http://schemas.microsoft.com/office/drawing/2014/main" id="{703AA209-35BF-D168-FF0D-5F99C9DF08EB}"/>
-                </a:ext>
-              </a:extLst>
-            </p:cNvPr>
-            <p:cNvPicPr>
-              <a:picLocks noChangeAspect="1" noChangeArrowheads="1"/>
-            </p:cNvPicPr>
-            <p:nvPr/>
-          </p:nvPicPr>
-          <p:blipFill>
-            <a:blip r:embed="rId18">
-              <a:extLst>
-                <a:ext uri="{28A0092B-C50C-407E-A947-70E740481C1C}">
-                  <a14:useLocalDpi xmlns:a14="http://schemas.microsoft.com/office/drawing/2010/main" val="0"/>
-                </a:ext>
-              </a:extLst>
-            </a:blip>
-            <a:srcRect/>
-            <a:stretch>
-              <a:fillRect/>
-            </a:stretch>
-          </p:blipFill>
-          <p:spPr bwMode="auto">
-            <a:xfrm>
-              <a:off x="8979640" y="4661249"/>
-              <a:ext cx="598793" cy="598793"/>
-            </a:xfrm>
-            <a:prstGeom prst="rect">
-              <a:avLst/>
-            </a:prstGeom>
-            <a:noFill/>
-            <a:extLst>
-              <a:ext uri="{909E8E84-426E-40DD-AFC4-6F175D3DCCD1}">
-                <a14:hiddenFill xmlns:a14="http://schemas.microsoft.com/office/drawing/2010/main">
-                  <a:solidFill>
-                    <a:srgbClr val="FFFFFF"/>
-                  </a:solidFill>
-                </a14:hiddenFill>
-              </a:ext>
-            </a:extLst>
-          </p:spPr>
-        </p:pic>
-        <p:pic>
-          <p:nvPicPr>
-            <p:cNvPr id="1050" name="Picture 26" descr="Packaged and custom services | FileHold">
-              <a:extLst>
-                <a:ext uri="{FF2B5EF4-FFF2-40B4-BE49-F238E27FC236}">
-                  <a16:creationId xmlns:a16="http://schemas.microsoft.com/office/drawing/2014/main" id="{E08BDB9A-7AD9-90E7-3FC9-62A4A1D9929F}"/>
-                </a:ext>
-              </a:extLst>
-            </p:cNvPr>
-            <p:cNvPicPr>
-              <a:picLocks noChangeAspect="1" noChangeArrowheads="1"/>
-            </p:cNvPicPr>
-            <p:nvPr/>
-          </p:nvPicPr>
-          <p:blipFill>
-            <a:blip r:embed="rId19">
-              <a:extLst>
-                <a:ext uri="{28A0092B-C50C-407E-A947-70E740481C1C}">
-                  <a14:useLocalDpi xmlns:a14="http://schemas.microsoft.com/office/drawing/2010/main" val="0"/>
-                </a:ext>
-              </a:extLst>
-            </a:blip>
-            <a:srcRect/>
-            <a:stretch>
-              <a:fillRect/>
-            </a:stretch>
-          </p:blipFill>
-          <p:spPr bwMode="auto">
-            <a:xfrm>
-              <a:off x="8531284" y="4799805"/>
-              <a:ext cx="383082" cy="383082"/>
-            </a:xfrm>
-            <a:prstGeom prst="rect">
-              <a:avLst/>
-            </a:prstGeom>
-            <a:noFill/>
-            <a:extLst>
-              <a:ext uri="{909E8E84-426E-40DD-AFC4-6F175D3DCCD1}">
-                <a14:hiddenFill xmlns:a14="http://schemas.microsoft.com/office/drawing/2010/main">
-                  <a:solidFill>
-                    <a:srgbClr val="FFFFFF"/>
-                  </a:solidFill>
-                </a14:hiddenFill>
-              </a:ext>
-            </a:extLst>
-          </p:spPr>
-        </p:pic>
-        <p:pic>
-          <p:nvPicPr>
-            <p:cNvPr id="1052" name="Picture 28" descr="professional Icon - Free PNG &amp; SVG 197051 - Noun Project">
-              <a:extLst>
-                <a:ext uri="{FF2B5EF4-FFF2-40B4-BE49-F238E27FC236}">
-                  <a16:creationId xmlns:a16="http://schemas.microsoft.com/office/drawing/2014/main" id="{0EC1D4EC-6146-A40B-CB0E-F93906112DE6}"/>
-                </a:ext>
-              </a:extLst>
-            </p:cNvPr>
-            <p:cNvPicPr>
-              <a:picLocks noChangeAspect="1" noChangeArrowheads="1"/>
-            </p:cNvPicPr>
-            <p:nvPr/>
-          </p:nvPicPr>
-          <p:blipFill>
-            <a:blip r:embed="rId20">
-              <a:extLst>
-                <a:ext uri="{28A0092B-C50C-407E-A947-70E740481C1C}">
-                  <a14:useLocalDpi xmlns:a14="http://schemas.microsoft.com/office/drawing/2010/main" val="0"/>
-                </a:ext>
-              </a:extLst>
-            </a:blip>
-            <a:srcRect/>
-            <a:stretch>
-              <a:fillRect/>
-            </a:stretch>
-          </p:blipFill>
-          <p:spPr bwMode="auto">
-            <a:xfrm>
-              <a:off x="7806483" y="4567343"/>
-              <a:ext cx="748011" cy="748011"/>
-            </a:xfrm>
-            <a:prstGeom prst="rect">
-              <a:avLst/>
-            </a:prstGeom>
-            <a:noFill/>
-            <a:extLst>
-              <a:ext uri="{909E8E84-426E-40DD-AFC4-6F175D3DCCD1}">
-                <a14:hiddenFill xmlns:a14="http://schemas.microsoft.com/office/drawing/2010/main">
-                  <a:solidFill>
-                    <a:srgbClr val="FFFFFF"/>
-                  </a:solidFill>
-                </a14:hiddenFill>
-              </a:ext>
-            </a:extLst>
-          </p:spPr>
-        </p:pic>
-      </p:grpSp>
+          <a:prstGeom prst="rect">
+            <a:avLst/>
+          </a:prstGeom>
+          <a:noFill/>
+          <a:extLst>
+            <a:ext uri="{909E8E84-426E-40DD-AFC4-6F175D3DCCD1}">
+              <a14:hiddenFill xmlns:a14="http://schemas.microsoft.com/office/drawing/2010/main">
+                <a:solidFill>
+                  <a:srgbClr val="FFFFFF"/>
+                </a:solidFill>
+              </a14:hiddenFill>
+            </a:ext>
+          </a:extLst>
+        </p:spPr>
+      </p:pic>
+      <p:sp>
+        <p:nvSpPr>
+          <p:cNvPr id="2" name="文字方塊 1">
+            <a:extLst>
+              <a:ext uri="{FF2B5EF4-FFF2-40B4-BE49-F238E27FC236}">
+                <a16:creationId xmlns:a16="http://schemas.microsoft.com/office/drawing/2014/main" id="{E7F65BD4-3B33-4DC9-6DE8-3D3A0D669AAB}"/>
+              </a:ext>
+            </a:extLst>
+          </p:cNvPr>
+          <p:cNvSpPr txBox="1"/>
+          <p:nvPr/>
+        </p:nvSpPr>
+        <p:spPr>
+          <a:xfrm>
+            <a:off x="2912962" y="256370"/>
+            <a:ext cx="6366075" cy="830997"/>
+          </a:xfrm>
+          <a:prstGeom prst="rect">
+            <a:avLst/>
+          </a:prstGeom>
+          <a:noFill/>
+        </p:spPr>
+        <p:txBody>
+          <a:bodyPr wrap="square" rtlCol="0">
+            <a:spAutoFit/>
+          </a:bodyPr>
+          <a:lstStyle/>
+          <a:p>
+            <a:pPr algn="ctr"/>
+            <a:r>
+              <a:rPr kumimoji="1" lang="zh-TW" altLang="en-US" sz="4800" b="1" u="sng" dirty="0">
+                <a:latin typeface="Microsoft JhengHei" panose="020B0604030504040204" pitchFamily="34" charset="-120"/>
+                <a:ea typeface="Microsoft JhengHei" panose="020B0604030504040204" pitchFamily="34" charset="-120"/>
+              </a:rPr>
+              <a:t>關鍵字推薦系統</a:t>
+            </a:r>
+          </a:p>
+        </p:txBody>
+      </p:sp>
+      <p:graphicFrame>
+        <p:nvGraphicFramePr>
+          <p:cNvPr id="5" name="資料庫圖表 4">
+            <a:extLst>
+              <a:ext uri="{FF2B5EF4-FFF2-40B4-BE49-F238E27FC236}">
+                <a16:creationId xmlns:a16="http://schemas.microsoft.com/office/drawing/2014/main" id="{C6FD20FC-5EE4-0EB5-8631-564E64796AFC}"/>
+              </a:ext>
+            </a:extLst>
+          </p:cNvPr>
+          <p:cNvGraphicFramePr/>
+          <p:nvPr>
+            <p:extLst>
+              <p:ext uri="{D42A27DB-BD31-4B8C-83A1-F6EECF244321}">
+                <p14:modId xmlns:p14="http://schemas.microsoft.com/office/powerpoint/2010/main" val="809065747"/>
+              </p:ext>
+            </p:extLst>
+          </p:nvPr>
+        </p:nvGraphicFramePr>
+        <p:xfrm>
+          <a:off x="2386507" y="2025878"/>
+          <a:ext cx="7720313" cy="4575751"/>
+        </p:xfrm>
+        <a:graphic>
+          <a:graphicData uri="http://schemas.openxmlformats.org/drawingml/2006/diagram">
+            <dgm:relIds xmlns:dgm="http://schemas.openxmlformats.org/drawingml/2006/diagram" xmlns:r="http://schemas.openxmlformats.org/officeDocument/2006/relationships" r:dm="rId3" r:lo="rId4" r:qs="rId5" r:cs="rId6"/>
+          </a:graphicData>
+        </a:graphic>
+      </p:graphicFrame>
+      <p:pic>
+        <p:nvPicPr>
+          <p:cNvPr id="1026" name="Picture 2" descr="How to Do Keyword Research – SEO Trends of 2021">
+            <a:extLst>
+              <a:ext uri="{FF2B5EF4-FFF2-40B4-BE49-F238E27FC236}">
+                <a16:creationId xmlns:a16="http://schemas.microsoft.com/office/drawing/2014/main" id="{D9CED916-48B1-93F3-5D4A-9B562355D267}"/>
+              </a:ext>
+            </a:extLst>
+          </p:cNvPr>
+          <p:cNvPicPr>
+            <a:picLocks noChangeAspect="1" noChangeArrowheads="1"/>
+          </p:cNvPicPr>
+          <p:nvPr/>
+        </p:nvPicPr>
+        <p:blipFill>
+          <a:blip r:embed="rId8">
+            <a:extLst>
+              <a:ext uri="{28A0092B-C50C-407E-A947-70E740481C1C}">
+                <a14:useLocalDpi xmlns:a14="http://schemas.microsoft.com/office/drawing/2010/main" val="0"/>
+              </a:ext>
+            </a:extLst>
+          </a:blip>
+          <a:srcRect/>
+          <a:stretch>
+            <a:fillRect/>
+          </a:stretch>
+        </p:blipFill>
+        <p:spPr bwMode="auto">
+          <a:xfrm>
+            <a:off x="5366518" y="1227628"/>
+            <a:ext cx="1760290" cy="925572"/>
+          </a:xfrm>
+          <a:prstGeom prst="rect">
+            <a:avLst/>
+          </a:prstGeom>
+          <a:noFill/>
+          <a:extLst>
+            <a:ext uri="{909E8E84-426E-40DD-AFC4-6F175D3DCCD1}">
+              <a14:hiddenFill xmlns:a14="http://schemas.microsoft.com/office/drawing/2010/main">
+                <a:solidFill>
+                  <a:srgbClr val="FFFFFF"/>
+                </a:solidFill>
+              </a14:hiddenFill>
+            </a:ext>
+          </a:extLst>
+        </p:spPr>
+      </p:pic>
+      <p:pic>
+        <p:nvPicPr>
+          <p:cNvPr id="4" name="圖片 3">
+            <a:extLst>
+              <a:ext uri="{FF2B5EF4-FFF2-40B4-BE49-F238E27FC236}">
+                <a16:creationId xmlns:a16="http://schemas.microsoft.com/office/drawing/2014/main" id="{9E24F8F6-AE2F-EA6C-A9FA-101051E002AD}"/>
+              </a:ext>
+            </a:extLst>
+          </p:cNvPr>
+          <p:cNvPicPr>
+            <a:picLocks noChangeAspect="1"/>
+          </p:cNvPicPr>
+          <p:nvPr/>
+        </p:nvPicPr>
+        <p:blipFill rotWithShape="1">
+          <a:blip r:embed="rId9"/>
+          <a:srcRect r="7674"/>
+          <a:stretch/>
+        </p:blipFill>
+        <p:spPr>
+          <a:xfrm>
+            <a:off x="2912962" y="1227627"/>
+            <a:ext cx="1760290" cy="890455"/>
+          </a:xfrm>
+          <a:prstGeom prst="rect">
+            <a:avLst/>
+          </a:prstGeom>
+        </p:spPr>
+      </p:pic>
+      <p:pic>
+        <p:nvPicPr>
+          <p:cNvPr id="1030" name="Picture 6" descr="Video - Free marketing icons">
+            <a:extLst>
+              <a:ext uri="{FF2B5EF4-FFF2-40B4-BE49-F238E27FC236}">
+                <a16:creationId xmlns:a16="http://schemas.microsoft.com/office/drawing/2014/main" id="{05997CD1-A576-9BE2-54CB-B69357B37BAA}"/>
+              </a:ext>
+            </a:extLst>
+          </p:cNvPr>
+          <p:cNvPicPr>
+            <a:picLocks noChangeAspect="1" noChangeArrowheads="1"/>
+          </p:cNvPicPr>
+          <p:nvPr/>
+        </p:nvPicPr>
+        <p:blipFill>
+          <a:blip r:embed="rId10">
+            <a:extLst>
+              <a:ext uri="{28A0092B-C50C-407E-A947-70E740481C1C}">
+                <a14:useLocalDpi xmlns:a14="http://schemas.microsoft.com/office/drawing/2010/main" val="0"/>
+              </a:ext>
+            </a:extLst>
+          </a:blip>
+          <a:srcRect/>
+          <a:stretch>
+            <a:fillRect/>
+          </a:stretch>
+        </p:blipFill>
+        <p:spPr bwMode="auto">
+          <a:xfrm>
+            <a:off x="7908476" y="3196851"/>
+            <a:ext cx="516273" cy="516273"/>
+          </a:xfrm>
+          <a:prstGeom prst="rect">
+            <a:avLst/>
+          </a:prstGeom>
+          <a:noFill/>
+          <a:extLst>
+            <a:ext uri="{909E8E84-426E-40DD-AFC4-6F175D3DCCD1}">
+              <a14:hiddenFill xmlns:a14="http://schemas.microsoft.com/office/drawing/2010/main">
+                <a:solidFill>
+                  <a:srgbClr val="FFFFFF"/>
+                </a:solidFill>
+              </a14:hiddenFill>
+            </a:ext>
+          </a:extLst>
+        </p:spPr>
+      </p:pic>
+      <p:pic>
+        <p:nvPicPr>
+          <p:cNvPr id="1032" name="Picture 8" descr="Txt text file extension symbol - Free interface icons">
+            <a:extLst>
+              <a:ext uri="{FF2B5EF4-FFF2-40B4-BE49-F238E27FC236}">
+                <a16:creationId xmlns:a16="http://schemas.microsoft.com/office/drawing/2014/main" id="{F0B1E37E-A961-A346-E2F5-B179E56DFA73}"/>
+              </a:ext>
+            </a:extLst>
+          </p:cNvPr>
+          <p:cNvPicPr>
+            <a:picLocks noChangeAspect="1" noChangeArrowheads="1"/>
+          </p:cNvPicPr>
+          <p:nvPr/>
+        </p:nvPicPr>
+        <p:blipFill>
+          <a:blip r:embed="rId11">
+            <a:extLst>
+              <a:ext uri="{28A0092B-C50C-407E-A947-70E740481C1C}">
+                <a14:useLocalDpi xmlns:a14="http://schemas.microsoft.com/office/drawing/2010/main" val="0"/>
+              </a:ext>
+            </a:extLst>
+          </a:blip>
+          <a:srcRect/>
+          <a:stretch>
+            <a:fillRect/>
+          </a:stretch>
+        </p:blipFill>
+        <p:spPr bwMode="auto">
+          <a:xfrm>
+            <a:off x="8948631" y="3203964"/>
+            <a:ext cx="516273" cy="516273"/>
+          </a:xfrm>
+          <a:prstGeom prst="rect">
+            <a:avLst/>
+          </a:prstGeom>
+          <a:noFill/>
+          <a:extLst>
+            <a:ext uri="{909E8E84-426E-40DD-AFC4-6F175D3DCCD1}">
+              <a14:hiddenFill xmlns:a14="http://schemas.microsoft.com/office/drawing/2010/main">
+                <a:solidFill>
+                  <a:srgbClr val="FFFFFF"/>
+                </a:solidFill>
+              </a14:hiddenFill>
+            </a:ext>
+          </a:extLst>
+        </p:spPr>
+      </p:pic>
+      <p:pic>
+        <p:nvPicPr>
+          <p:cNvPr id="1034" name="Picture 10" descr="GitHub - Lei-Cai/NLP-jieba: 结巴中文分词">
+            <a:extLst>
+              <a:ext uri="{FF2B5EF4-FFF2-40B4-BE49-F238E27FC236}">
+                <a16:creationId xmlns:a16="http://schemas.microsoft.com/office/drawing/2014/main" id="{CB0187F0-7767-8229-44F2-DFDB42E967F7}"/>
+              </a:ext>
+            </a:extLst>
+          </p:cNvPr>
+          <p:cNvPicPr>
+            <a:picLocks noChangeAspect="1" noChangeArrowheads="1"/>
+          </p:cNvPicPr>
+          <p:nvPr/>
+        </p:nvPicPr>
+        <p:blipFill rotWithShape="1">
+          <a:blip r:embed="rId12">
+            <a:extLst>
+              <a:ext uri="{28A0092B-C50C-407E-A947-70E740481C1C}">
+                <a14:useLocalDpi xmlns:a14="http://schemas.microsoft.com/office/drawing/2010/main" val="0"/>
+              </a:ext>
+            </a:extLst>
+          </a:blip>
+          <a:srcRect b="41342"/>
+          <a:stretch/>
+        </p:blipFill>
+        <p:spPr bwMode="auto">
+          <a:xfrm>
+            <a:off x="5366518" y="3316402"/>
+            <a:ext cx="1760290" cy="516274"/>
+          </a:xfrm>
+          <a:prstGeom prst="rect">
+            <a:avLst/>
+          </a:prstGeom>
+          <a:noFill/>
+          <a:extLst>
+            <a:ext uri="{909E8E84-426E-40DD-AFC4-6F175D3DCCD1}">
+              <a14:hiddenFill xmlns:a14="http://schemas.microsoft.com/office/drawing/2010/main">
+                <a:solidFill>
+                  <a:srgbClr val="FFFFFF"/>
+                </a:solidFill>
+              </a14:hiddenFill>
+            </a:ext>
+          </a:extLst>
+        </p:spPr>
+      </p:pic>
+      <p:pic>
+        <p:nvPicPr>
+          <p:cNvPr id="1036" name="Picture 12" descr="Comment utiliser TF-IDF pour le référencement">
+            <a:extLst>
+              <a:ext uri="{FF2B5EF4-FFF2-40B4-BE49-F238E27FC236}">
+                <a16:creationId xmlns:a16="http://schemas.microsoft.com/office/drawing/2014/main" id="{96F0E6B5-5B2C-C4CB-8B37-A8FAE9CC55F2}"/>
+              </a:ext>
+            </a:extLst>
+          </p:cNvPr>
+          <p:cNvPicPr>
+            <a:picLocks noChangeAspect="1" noChangeArrowheads="1"/>
+          </p:cNvPicPr>
+          <p:nvPr/>
+        </p:nvPicPr>
+        <p:blipFill rotWithShape="1">
+          <a:blip r:embed="rId13">
+            <a:extLst>
+              <a:ext uri="{28A0092B-C50C-407E-A947-70E740481C1C}">
+                <a14:useLocalDpi xmlns:a14="http://schemas.microsoft.com/office/drawing/2010/main" val="0"/>
+              </a:ext>
+            </a:extLst>
+          </a:blip>
+          <a:srcRect l="446" t="12648" r="-446" b="25322"/>
+          <a:stretch/>
+        </p:blipFill>
+        <p:spPr bwMode="auto">
+          <a:xfrm>
+            <a:off x="3206601" y="3238831"/>
+            <a:ext cx="1173011" cy="481406"/>
+          </a:xfrm>
+          <a:prstGeom prst="rect">
+            <a:avLst/>
+          </a:prstGeom>
+          <a:noFill/>
+          <a:extLst>
+            <a:ext uri="{909E8E84-426E-40DD-AFC4-6F175D3DCCD1}">
+              <a14:hiddenFill xmlns:a14="http://schemas.microsoft.com/office/drawing/2010/main">
+                <a:solidFill>
+                  <a:srgbClr val="FFFFFF"/>
+                </a:solidFill>
+              </a14:hiddenFill>
+            </a:ext>
+          </a:extLst>
+        </p:spPr>
+      </p:pic>
+      <p:pic>
+        <p:nvPicPr>
+          <p:cNvPr id="1042" name="Picture 18" descr="Ranking - Free seo and web icons">
+            <a:extLst>
+              <a:ext uri="{FF2B5EF4-FFF2-40B4-BE49-F238E27FC236}">
+                <a16:creationId xmlns:a16="http://schemas.microsoft.com/office/drawing/2014/main" id="{F8ED74AC-3206-4EB6-5F29-07A95D71B0E4}"/>
+              </a:ext>
+            </a:extLst>
+          </p:cNvPr>
+          <p:cNvPicPr>
+            <a:picLocks noChangeAspect="1" noChangeArrowheads="1"/>
+          </p:cNvPicPr>
+          <p:nvPr/>
+        </p:nvPicPr>
+        <p:blipFill>
+          <a:blip r:embed="rId14">
+            <a:extLst>
+              <a:ext uri="{28A0092B-C50C-407E-A947-70E740481C1C}">
+                <a14:useLocalDpi xmlns:a14="http://schemas.microsoft.com/office/drawing/2010/main" val="0"/>
+              </a:ext>
+            </a:extLst>
+          </a:blip>
+          <a:srcRect/>
+          <a:stretch>
+            <a:fillRect/>
+          </a:stretch>
+        </p:blipFill>
+        <p:spPr bwMode="auto">
+          <a:xfrm>
+            <a:off x="4023579" y="4902671"/>
+            <a:ext cx="594445" cy="594445"/>
+          </a:xfrm>
+          <a:prstGeom prst="rect">
+            <a:avLst/>
+          </a:prstGeom>
+          <a:noFill/>
+          <a:extLst>
+            <a:ext uri="{909E8E84-426E-40DD-AFC4-6F175D3DCCD1}">
+              <a14:hiddenFill xmlns:a14="http://schemas.microsoft.com/office/drawing/2010/main">
+                <a:solidFill>
+                  <a:srgbClr val="FFFFFF"/>
+                </a:solidFill>
+              </a14:hiddenFill>
+            </a:ext>
+          </a:extLst>
+        </p:spPr>
+      </p:pic>
+      <p:pic>
+        <p:nvPicPr>
+          <p:cNvPr id="1044" name="Picture 20" descr="Keyword Research Icon PNG Images, Vectors Free Download - Pngtree">
+            <a:extLst>
+              <a:ext uri="{FF2B5EF4-FFF2-40B4-BE49-F238E27FC236}">
+                <a16:creationId xmlns:a16="http://schemas.microsoft.com/office/drawing/2014/main" id="{4E8B475F-A1C9-F6B5-618D-E761FF2C9FBE}"/>
+              </a:ext>
+            </a:extLst>
+          </p:cNvPr>
+          <p:cNvPicPr>
+            <a:picLocks noChangeAspect="1" noChangeArrowheads="1"/>
+          </p:cNvPicPr>
+          <p:nvPr/>
+        </p:nvPicPr>
+        <p:blipFill>
+          <a:blip r:embed="rId15">
+            <a:extLst>
+              <a:ext uri="{28A0092B-C50C-407E-A947-70E740481C1C}">
+                <a14:useLocalDpi xmlns:a14="http://schemas.microsoft.com/office/drawing/2010/main" val="0"/>
+              </a:ext>
+            </a:extLst>
+          </a:blip>
+          <a:srcRect/>
+          <a:stretch>
+            <a:fillRect/>
+          </a:stretch>
+        </p:blipFill>
+        <p:spPr bwMode="auto">
+          <a:xfrm>
+            <a:off x="2977862" y="4902670"/>
+            <a:ext cx="594446" cy="594446"/>
+          </a:xfrm>
+          <a:prstGeom prst="rect">
+            <a:avLst/>
+          </a:prstGeom>
+          <a:noFill/>
+          <a:extLst>
+            <a:ext uri="{909E8E84-426E-40DD-AFC4-6F175D3DCCD1}">
+              <a14:hiddenFill xmlns:a14="http://schemas.microsoft.com/office/drawing/2010/main">
+                <a:solidFill>
+                  <a:srgbClr val="FFFFFF"/>
+                </a:solidFill>
+              </a14:hiddenFill>
+            </a:ext>
+          </a:extLst>
+        </p:spPr>
+      </p:pic>
+      <p:pic>
+        <p:nvPicPr>
+          <p:cNvPr id="1046" name="Picture 22" descr="Report - Free seo and web icons">
+            <a:extLst>
+              <a:ext uri="{FF2B5EF4-FFF2-40B4-BE49-F238E27FC236}">
+                <a16:creationId xmlns:a16="http://schemas.microsoft.com/office/drawing/2014/main" id="{703AA209-35BF-D168-FF0D-5F99C9DF08EB}"/>
+              </a:ext>
+            </a:extLst>
+          </p:cNvPr>
+          <p:cNvPicPr>
+            <a:picLocks noChangeAspect="1" noChangeArrowheads="1"/>
+          </p:cNvPicPr>
+          <p:nvPr/>
+        </p:nvPicPr>
+        <p:blipFill>
+          <a:blip r:embed="rId16">
+            <a:extLst>
+              <a:ext uri="{28A0092B-C50C-407E-A947-70E740481C1C}">
+                <a14:useLocalDpi xmlns:a14="http://schemas.microsoft.com/office/drawing/2010/main" val="0"/>
+              </a:ext>
+            </a:extLst>
+          </a:blip>
+          <a:srcRect/>
+          <a:stretch>
+            <a:fillRect/>
+          </a:stretch>
+        </p:blipFill>
+        <p:spPr bwMode="auto">
+          <a:xfrm>
+            <a:off x="6528015" y="4917619"/>
+            <a:ext cx="598793" cy="598793"/>
+          </a:xfrm>
+          <a:prstGeom prst="rect">
+            <a:avLst/>
+          </a:prstGeom>
+          <a:noFill/>
+          <a:extLst>
+            <a:ext uri="{909E8E84-426E-40DD-AFC4-6F175D3DCCD1}">
+              <a14:hiddenFill xmlns:a14="http://schemas.microsoft.com/office/drawing/2010/main">
+                <a:solidFill>
+                  <a:srgbClr val="FFFFFF"/>
+                </a:solidFill>
+              </a14:hiddenFill>
+            </a:ext>
+          </a:extLst>
+        </p:spPr>
+      </p:pic>
+      <p:pic>
+        <p:nvPicPr>
+          <p:cNvPr id="1050" name="Picture 26" descr="Packaged and custom services | FileHold">
+            <a:extLst>
+              <a:ext uri="{FF2B5EF4-FFF2-40B4-BE49-F238E27FC236}">
+                <a16:creationId xmlns:a16="http://schemas.microsoft.com/office/drawing/2014/main" id="{E08BDB9A-7AD9-90E7-3FC9-62A4A1D9929F}"/>
+              </a:ext>
+            </a:extLst>
+          </p:cNvPr>
+          <p:cNvPicPr>
+            <a:picLocks noChangeAspect="1" noChangeArrowheads="1"/>
+          </p:cNvPicPr>
+          <p:nvPr/>
+        </p:nvPicPr>
+        <p:blipFill>
+          <a:blip r:embed="rId17">
+            <a:extLst>
+              <a:ext uri="{28A0092B-C50C-407E-A947-70E740481C1C}">
+                <a14:useLocalDpi xmlns:a14="http://schemas.microsoft.com/office/drawing/2010/main" val="0"/>
+              </a:ext>
+            </a:extLst>
+          </a:blip>
+          <a:srcRect/>
+          <a:stretch>
+            <a:fillRect/>
+          </a:stretch>
+        </p:blipFill>
+        <p:spPr bwMode="auto">
+          <a:xfrm>
+            <a:off x="6079659" y="5056175"/>
+            <a:ext cx="383082" cy="383082"/>
+          </a:xfrm>
+          <a:prstGeom prst="rect">
+            <a:avLst/>
+          </a:prstGeom>
+          <a:noFill/>
+          <a:extLst>
+            <a:ext uri="{909E8E84-426E-40DD-AFC4-6F175D3DCCD1}">
+              <a14:hiddenFill xmlns:a14="http://schemas.microsoft.com/office/drawing/2010/main">
+                <a:solidFill>
+                  <a:srgbClr val="FFFFFF"/>
+                </a:solidFill>
+              </a14:hiddenFill>
+            </a:ext>
+          </a:extLst>
+        </p:spPr>
+      </p:pic>
+      <p:pic>
+        <p:nvPicPr>
+          <p:cNvPr id="1052" name="Picture 28" descr="professional Icon - Free PNG &amp; SVG 197051 - Noun Project">
+            <a:extLst>
+              <a:ext uri="{FF2B5EF4-FFF2-40B4-BE49-F238E27FC236}">
+                <a16:creationId xmlns:a16="http://schemas.microsoft.com/office/drawing/2014/main" id="{0EC1D4EC-6146-A40B-CB0E-F93906112DE6}"/>
+              </a:ext>
+            </a:extLst>
+          </p:cNvPr>
+          <p:cNvPicPr>
+            <a:picLocks noChangeAspect="1" noChangeArrowheads="1"/>
+          </p:cNvPicPr>
+          <p:nvPr/>
+        </p:nvPicPr>
+        <p:blipFill>
+          <a:blip r:embed="rId18">
+            <a:extLst>
+              <a:ext uri="{28A0092B-C50C-407E-A947-70E740481C1C}">
+                <a14:useLocalDpi xmlns:a14="http://schemas.microsoft.com/office/drawing/2010/main" val="0"/>
+              </a:ext>
+            </a:extLst>
+          </a:blip>
+          <a:srcRect/>
+          <a:stretch>
+            <a:fillRect/>
+          </a:stretch>
+        </p:blipFill>
+        <p:spPr bwMode="auto">
+          <a:xfrm>
+            <a:off x="5354858" y="4823713"/>
+            <a:ext cx="748011" cy="748011"/>
+          </a:xfrm>
+          <a:prstGeom prst="rect">
+            <a:avLst/>
+          </a:prstGeom>
+          <a:noFill/>
+          <a:extLst>
+            <a:ext uri="{909E8E84-426E-40DD-AFC4-6F175D3DCCD1}">
+              <a14:hiddenFill xmlns:a14="http://schemas.microsoft.com/office/drawing/2010/main">
+                <a:solidFill>
+                  <a:srgbClr val="FFFFFF"/>
+                </a:solidFill>
+              </a14:hiddenFill>
+            </a:ext>
+          </a:extLst>
+        </p:spPr>
+      </p:pic>
+      <p:pic>
+        <p:nvPicPr>
+          <p:cNvPr id="3" name="Picture 2">
+            <a:extLst>
+              <a:ext uri="{FF2B5EF4-FFF2-40B4-BE49-F238E27FC236}">
+                <a16:creationId xmlns:a16="http://schemas.microsoft.com/office/drawing/2014/main" id="{0676D381-2E67-2132-9905-31DB08FC6D1B}"/>
+              </a:ext>
+            </a:extLst>
+          </p:cNvPr>
+          <p:cNvPicPr>
+            <a:picLocks noChangeAspect="1" noChangeArrowheads="1"/>
+          </p:cNvPicPr>
+          <p:nvPr/>
+        </p:nvPicPr>
+        <p:blipFill>
+          <a:blip r:embed="rId19">
+            <a:extLst>
+              <a:ext uri="{28A0092B-C50C-407E-A947-70E740481C1C}">
+                <a14:useLocalDpi xmlns:a14="http://schemas.microsoft.com/office/drawing/2010/main" val="0"/>
+              </a:ext>
+            </a:extLst>
+          </a:blip>
+          <a:srcRect/>
+          <a:stretch>
+            <a:fillRect/>
+          </a:stretch>
+        </p:blipFill>
+        <p:spPr bwMode="auto">
+          <a:xfrm>
+            <a:off x="7885017" y="5004551"/>
+            <a:ext cx="1605068" cy="434706"/>
+          </a:xfrm>
+          <a:prstGeom prst="rect">
+            <a:avLst/>
+          </a:prstGeom>
+          <a:noFill/>
+          <a:extLst>
+            <a:ext uri="{909E8E84-426E-40DD-AFC4-6F175D3DCCD1}">
+              <a14:hiddenFill xmlns:a14="http://schemas.microsoft.com/office/drawing/2010/main">
+                <a:solidFill>
+                  <a:srgbClr val="FFFFFF"/>
+                </a:solidFill>
+              </a14:hiddenFill>
+            </a:ext>
+          </a:extLst>
+        </p:spPr>
+      </p:pic>
     </p:spTree>
     <p:extLst>
       <p:ext uri="{BB962C8B-B14F-4D97-AF65-F5344CB8AC3E}">

</xml_diff>